<commit_message>
new version for Fall 2024
</commit_message>
<xml_diff>
--- a/Slides/PH223_Lecture_49.pptx
+++ b/Slides/PH223_Lecture_49.pptx
@@ -5,7 +5,7 @@
     <p:sldMasterId id="2147483648" r:id="rId1"/>
   </p:sldMasterIdLst>
   <p:notesMasterIdLst>
-    <p:notesMasterId r:id="rId26"/>
+    <p:notesMasterId r:id="rId27"/>
   </p:notesMasterIdLst>
   <p:sldIdLst>
     <p:sldId id="266" r:id="rId2"/>
@@ -26,12 +26,13 @@
     <p:sldId id="277" r:id="rId17"/>
     <p:sldId id="272" r:id="rId18"/>
     <p:sldId id="259" r:id="rId19"/>
-    <p:sldId id="278" r:id="rId20"/>
-    <p:sldId id="279" r:id="rId21"/>
-    <p:sldId id="260" r:id="rId22"/>
-    <p:sldId id="261" r:id="rId23"/>
-    <p:sldId id="262" r:id="rId24"/>
-    <p:sldId id="263" r:id="rId25"/>
+    <p:sldId id="280" r:id="rId20"/>
+    <p:sldId id="278" r:id="rId21"/>
+    <p:sldId id="279" r:id="rId22"/>
+    <p:sldId id="260" r:id="rId23"/>
+    <p:sldId id="261" r:id="rId24"/>
+    <p:sldId id="262" r:id="rId25"/>
+    <p:sldId id="263" r:id="rId26"/>
   </p:sldIdLst>
   <p:sldSz cx="9144000" cy="6858000" type="screen4x3"/>
   <p:notesSz cx="6858000" cy="9144000"/>
@@ -152,7 +153,7 @@
 <file path=ppt/revisionInfo.xml><?xml version="1.0" encoding="utf-8"?>
 <p1510:revInfo xmlns:a="http://schemas.openxmlformats.org/drawingml/2006/main" xmlns:r="http://schemas.openxmlformats.org/officeDocument/2006/relationships" xmlns:p1510="http://schemas.microsoft.com/office/powerpoint/2015/10/main">
   <p1510:revLst>
-    <p1510:client id="{7039716D-5DA8-41A5-A9D4-BF52DEC90AAC}" v="107" dt="2023-12-02T01:28:25.676"/>
+    <p1510:client id="{36C90580-E955-4D27-A6BF-8F4AEF157863}" v="8" dt="2024-07-18T17:09:27.224"/>
   </p1510:revLst>
 </p1510:revInfo>
 </file>
@@ -3421,6 +3422,62 @@
             <ac:spMk id="3" creationId="{1E2B2D5B-3246-F7D9-E9C8-4A9D0DC99395}"/>
           </ac:spMkLst>
         </pc:spChg>
+      </pc:sldChg>
+    </pc:docChg>
+  </pc:docChgLst>
+  <pc:docChgLst>
+    <pc:chgData name="Lines, Todd" userId="afaf7c3a-e8aa-4568-882a-02ad8f9e19b0" providerId="ADAL" clId="{36C90580-E955-4D27-A6BF-8F4AEF157863}"/>
+    <pc:docChg chg="custSel addSld modSld">
+      <pc:chgData name="Lines, Todd" userId="afaf7c3a-e8aa-4568-882a-02ad8f9e19b0" providerId="ADAL" clId="{36C90580-E955-4D27-A6BF-8F4AEF157863}" dt="2024-07-18T17:09:27.224" v="7" actId="1076"/>
+      <pc:docMkLst>
+        <pc:docMk/>
+      </pc:docMkLst>
+      <pc:sldChg chg="addSp delSp modSp new mod">
+        <pc:chgData name="Lines, Todd" userId="afaf7c3a-e8aa-4568-882a-02ad8f9e19b0" providerId="ADAL" clId="{36C90580-E955-4D27-A6BF-8F4AEF157863}" dt="2024-07-18T17:09:27.224" v="7" actId="1076"/>
+        <pc:sldMkLst>
+          <pc:docMk/>
+          <pc:sldMk cId="1333327382" sldId="280"/>
+        </pc:sldMkLst>
+        <pc:spChg chg="del">
+          <ac:chgData name="Lines, Todd" userId="afaf7c3a-e8aa-4568-882a-02ad8f9e19b0" providerId="ADAL" clId="{36C90580-E955-4D27-A6BF-8F4AEF157863}" dt="2024-07-18T17:08:37.669" v="2"/>
+          <ac:spMkLst>
+            <pc:docMk/>
+            <pc:sldMk cId="1333327382" sldId="280"/>
+            <ac:spMk id="3" creationId="{ACCE0111-3816-83D8-99A9-3E76C6A9D853}"/>
+          </ac:spMkLst>
+        </pc:spChg>
+        <pc:picChg chg="del">
+          <ac:chgData name="Lines, Todd" userId="afaf7c3a-e8aa-4568-882a-02ad8f9e19b0" providerId="ADAL" clId="{36C90580-E955-4D27-A6BF-8F4AEF157863}" dt="2024-07-18T17:08:49" v="3" actId="21"/>
+          <ac:picMkLst>
+            <pc:docMk/>
+            <pc:sldMk cId="1333327382" sldId="280"/>
+            <ac:picMk id="5" creationId="{06077E77-D426-8002-3DAD-07987E0FD08D}"/>
+          </ac:picMkLst>
+        </pc:picChg>
+        <pc:picChg chg="del">
+          <ac:chgData name="Lines, Todd" userId="afaf7c3a-e8aa-4568-882a-02ad8f9e19b0" providerId="ADAL" clId="{36C90580-E955-4D27-A6BF-8F4AEF157863}" dt="2024-07-18T17:09:06.896" v="4" actId="21"/>
+          <ac:picMkLst>
+            <pc:docMk/>
+            <pc:sldMk cId="1333327382" sldId="280"/>
+            <ac:picMk id="6" creationId="{6C9D7819-BEA5-7BB9-EA32-F432075A879C}"/>
+          </ac:picMkLst>
+        </pc:picChg>
+        <pc:picChg chg="add">
+          <ac:chgData name="Lines, Todd" userId="afaf7c3a-e8aa-4568-882a-02ad8f9e19b0" providerId="ADAL" clId="{36C90580-E955-4D27-A6BF-8F4AEF157863}" dt="2024-07-18T17:07:46.265" v="1"/>
+          <ac:picMkLst>
+            <pc:docMk/>
+            <pc:sldMk cId="1333327382" sldId="280"/>
+            <ac:picMk id="1026" creationId="{7DEF3A3B-706D-F50B-3B19-A429385D85E9}"/>
+          </ac:picMkLst>
+        </pc:picChg>
+        <pc:picChg chg="add mod">
+          <ac:chgData name="Lines, Todd" userId="afaf7c3a-e8aa-4568-882a-02ad8f9e19b0" providerId="ADAL" clId="{36C90580-E955-4D27-A6BF-8F4AEF157863}" dt="2024-07-18T17:09:27.224" v="7" actId="1076"/>
+          <ac:picMkLst>
+            <pc:docMk/>
+            <pc:sldMk cId="1333327382" sldId="280"/>
+            <ac:picMk id="1028" creationId="{3A78A946-1147-74E4-C4CA-A2798703B1B4}"/>
+          </ac:picMkLst>
+        </pc:picChg>
       </pc:sldChg>
     </pc:docChg>
   </pc:docChgLst>
@@ -3510,7 +3567,7 @@
             <a:fld id="{08796A71-8BED-4667-97D9-7FC4594A6158}" type="datetimeFigureOut">
               <a:rPr lang="en-US" smtClean="0"/>
               <a:pPr/>
-              <a:t>12/5/2023</a:t>
+              <a:t>7/18/2024</a:t>
             </a:fld>
             <a:endParaRPr lang="en-US"/>
           </a:p>
@@ -3848,7 +3905,7 @@
             <a:fld id="{073F8353-DA18-4A0E-B89B-B4051FD74AAE}" type="slidenum">
               <a:rPr lang="en-US" smtClean="0"/>
               <a:pPr/>
-              <a:t>22</a:t>
+              <a:t>23</a:t>
             </a:fld>
             <a:endParaRPr lang="en-US"/>
           </a:p>
@@ -4042,7 +4099,7 @@
             <a:fld id="{ED6A184A-19EA-4F21-91CB-5E7B961A1670}" type="datetimeFigureOut">
               <a:rPr lang="en-US" smtClean="0"/>
               <a:pPr/>
-              <a:t>12/5/2023</a:t>
+              <a:t>7/18/2024</a:t>
             </a:fld>
             <a:endParaRPr lang="en-US"/>
           </a:p>
@@ -4207,7 +4264,7 @@
             <a:fld id="{ED6A184A-19EA-4F21-91CB-5E7B961A1670}" type="datetimeFigureOut">
               <a:rPr lang="en-US" smtClean="0"/>
               <a:pPr/>
-              <a:t>12/5/2023</a:t>
+              <a:t>7/18/2024</a:t>
             </a:fld>
             <a:endParaRPr lang="en-US"/>
           </a:p>
@@ -4382,7 +4439,7 @@
             <a:fld id="{ED6A184A-19EA-4F21-91CB-5E7B961A1670}" type="datetimeFigureOut">
               <a:rPr lang="en-US" smtClean="0"/>
               <a:pPr/>
-              <a:t>12/5/2023</a:t>
+              <a:t>7/18/2024</a:t>
             </a:fld>
             <a:endParaRPr lang="en-US"/>
           </a:p>
@@ -4547,7 +4604,7 @@
             <a:fld id="{ED6A184A-19EA-4F21-91CB-5E7B961A1670}" type="datetimeFigureOut">
               <a:rPr lang="en-US" smtClean="0"/>
               <a:pPr/>
-              <a:t>12/5/2023</a:t>
+              <a:t>7/18/2024</a:t>
             </a:fld>
             <a:endParaRPr lang="en-US"/>
           </a:p>
@@ -4789,7 +4846,7 @@
             <a:fld id="{ED6A184A-19EA-4F21-91CB-5E7B961A1670}" type="datetimeFigureOut">
               <a:rPr lang="en-US" smtClean="0"/>
               <a:pPr/>
-              <a:t>12/5/2023</a:t>
+              <a:t>7/18/2024</a:t>
             </a:fld>
             <a:endParaRPr lang="en-US"/>
           </a:p>
@@ -5071,7 +5128,7 @@
             <a:fld id="{ED6A184A-19EA-4F21-91CB-5E7B961A1670}" type="datetimeFigureOut">
               <a:rPr lang="en-US" smtClean="0"/>
               <a:pPr/>
-              <a:t>12/5/2023</a:t>
+              <a:t>7/18/2024</a:t>
             </a:fld>
             <a:endParaRPr lang="en-US"/>
           </a:p>
@@ -5487,7 +5544,7 @@
             <a:fld id="{ED6A184A-19EA-4F21-91CB-5E7B961A1670}" type="datetimeFigureOut">
               <a:rPr lang="en-US" smtClean="0"/>
               <a:pPr/>
-              <a:t>12/5/2023</a:t>
+              <a:t>7/18/2024</a:t>
             </a:fld>
             <a:endParaRPr lang="en-US"/>
           </a:p>
@@ -5601,7 +5658,7 @@
             <a:fld id="{ED6A184A-19EA-4F21-91CB-5E7B961A1670}" type="datetimeFigureOut">
               <a:rPr lang="en-US" smtClean="0"/>
               <a:pPr/>
-              <a:t>12/5/2023</a:t>
+              <a:t>7/18/2024</a:t>
             </a:fld>
             <a:endParaRPr lang="en-US"/>
           </a:p>
@@ -5693,7 +5750,7 @@
             <a:fld id="{ED6A184A-19EA-4F21-91CB-5E7B961A1670}" type="datetimeFigureOut">
               <a:rPr lang="en-US" smtClean="0"/>
               <a:pPr/>
-              <a:t>12/5/2023</a:t>
+              <a:t>7/18/2024</a:t>
             </a:fld>
             <a:endParaRPr lang="en-US"/>
           </a:p>
@@ -5965,7 +6022,7 @@
             <a:fld id="{ED6A184A-19EA-4F21-91CB-5E7B961A1670}" type="datetimeFigureOut">
               <a:rPr lang="en-US" smtClean="0"/>
               <a:pPr/>
-              <a:t>12/5/2023</a:t>
+              <a:t>7/18/2024</a:t>
             </a:fld>
             <a:endParaRPr lang="en-US"/>
           </a:p>
@@ -6214,7 +6271,7 @@
             <a:fld id="{ED6A184A-19EA-4F21-91CB-5E7B961A1670}" type="datetimeFigureOut">
               <a:rPr lang="en-US" smtClean="0"/>
               <a:pPr/>
-              <a:t>12/5/2023</a:t>
+              <a:t>7/18/2024</a:t>
             </a:fld>
             <a:endParaRPr lang="en-US"/>
           </a:p>
@@ -6422,7 +6479,7 @@
             <a:fld id="{ED6A184A-19EA-4F21-91CB-5E7B961A1670}" type="datetimeFigureOut">
               <a:rPr lang="en-US" smtClean="0"/>
               <a:pPr/>
-              <a:t>12/5/2023</a:t>
+              <a:t>7/18/2024</a:t>
             </a:fld>
             <a:endParaRPr lang="en-US"/>
           </a:p>
@@ -19277,7 +19334,7 @@
           <p:cNvPr id="2" name="Title 1">
             <a:extLst>
               <a:ext uri="{FF2B5EF4-FFF2-40B4-BE49-F238E27FC236}">
-                <a16:creationId xmlns:a16="http://schemas.microsoft.com/office/drawing/2014/main" id="{88F79F87-888F-CE19-E30F-57F12205B401}"/>
+                <a16:creationId xmlns:a16="http://schemas.microsoft.com/office/drawing/2014/main" id="{B5B3BBAD-8E2F-5165-883C-3ABB1F1B604A}"/>
               </a:ext>
             </a:extLst>
           </p:cNvPr>
@@ -19293,78 +19350,140 @@
           <a:bodyPr/>
           <a:lstStyle/>
           <a:p>
-            <a:r>
-              <a:rPr lang="en-US" dirty="0"/>
-              <a:t>Question</a:t>
-            </a:r>
+            <a:endParaRPr lang="en-US"/>
           </a:p>
         </p:txBody>
       </p:sp>
-      <p:sp>
-        <p:nvSpPr>
-          <p:cNvPr id="3" name="Content Placeholder 2">
+      <p:pic>
+        <p:nvPicPr>
+          <p:cNvPr id="1026" name="Picture 2">
             <a:extLst>
               <a:ext uri="{FF2B5EF4-FFF2-40B4-BE49-F238E27FC236}">
-                <a16:creationId xmlns:a16="http://schemas.microsoft.com/office/drawing/2014/main" id="{1E2B2D5B-3246-F7D9-E9C8-4A9D0DC99395}"/>
+                <a16:creationId xmlns:a16="http://schemas.microsoft.com/office/drawing/2014/main" id="{7DEF3A3B-706D-F50B-3B19-A429385D85E9}"/>
               </a:ext>
             </a:extLst>
           </p:cNvPr>
-          <p:cNvSpPr>
-            <a:spLocks noGrp="1"/>
-          </p:cNvSpPr>
+          <p:cNvPicPr>
+            <a:picLocks noChangeAspect="1" noChangeArrowheads="1"/>
+          </p:cNvPicPr>
+          <p:nvPr/>
+        </p:nvPicPr>
+        <p:blipFill>
+          <a:blip r:embed="rId2">
+            <a:extLst>
+              <a:ext uri="{28A0092B-C50C-407E-A947-70E740481C1C}">
+                <a14:useLocalDpi xmlns:a14="http://schemas.microsoft.com/office/drawing/2010/main" val="0"/>
+              </a:ext>
+            </a:extLst>
+          </a:blip>
+          <a:srcRect/>
+          <a:stretch>
+            <a:fillRect/>
+          </a:stretch>
+        </p:blipFill>
+        <p:spPr bwMode="auto">
+          <a:xfrm>
+            <a:off x="3348038" y="2571750"/>
+            <a:ext cx="2447925" cy="1714500"/>
+          </a:xfrm>
+          <a:prstGeom prst="rect">
+            <a:avLst/>
+          </a:prstGeom>
+          <a:noFill/>
+          <a:extLst>
+            <a:ext uri="{909E8E84-426E-40DD-AFC4-6F175D3DCCD1}">
+              <a14:hiddenFill xmlns:a14="http://schemas.microsoft.com/office/drawing/2010/main">
+                <a:solidFill>
+                  <a:srgbClr val="FFFFFF"/>
+                </a:solidFill>
+              </a14:hiddenFill>
+            </a:ext>
+          </a:extLst>
+        </p:spPr>
+      </p:pic>
+      <p:pic>
+        <p:nvPicPr>
+          <p:cNvPr id="4" name="Picture 3">
+            <a:extLst>
+              <a:ext uri="{FF2B5EF4-FFF2-40B4-BE49-F238E27FC236}">
+                <a16:creationId xmlns:a16="http://schemas.microsoft.com/office/drawing/2014/main" id="{5903D7C9-D276-0F39-B8CC-DB6E4CDFD4E7}"/>
+              </a:ext>
+            </a:extLst>
+          </p:cNvPr>
+          <p:cNvPicPr>
+            <a:picLocks noChangeAspect="1"/>
+          </p:cNvPicPr>
+          <p:nvPr/>
+        </p:nvPicPr>
+        <p:blipFill>
+          <a:blip r:embed="rId3"/>
+          <a:stretch>
+            <a:fillRect/>
+          </a:stretch>
+        </p:blipFill>
+        <p:spPr>
+          <a:xfrm>
+            <a:off x="3497580" y="2724150"/>
+            <a:ext cx="2453640" cy="1714500"/>
+          </a:xfrm>
+          <a:prstGeom prst="rect">
+            <a:avLst/>
+          </a:prstGeom>
+        </p:spPr>
+      </p:pic>
+      <p:pic>
+        <p:nvPicPr>
+          <p:cNvPr id="1028" name="Picture 4">
+            <a:extLst>
+              <a:ext uri="{FF2B5EF4-FFF2-40B4-BE49-F238E27FC236}">
+                <a16:creationId xmlns:a16="http://schemas.microsoft.com/office/drawing/2014/main" id="{3A78A946-1147-74E4-C4CA-A2798703B1B4}"/>
+              </a:ext>
+            </a:extLst>
+          </p:cNvPr>
+          <p:cNvPicPr>
+            <a:picLocks noGrp="1" noChangeAspect="1" noChangeArrowheads="1"/>
+          </p:cNvPicPr>
           <p:nvPr>
             <p:ph idx="1"/>
           </p:nvPr>
-        </p:nvSpPr>
-        <p:spPr/>
-        <p:txBody>
-          <a:bodyPr/>
-          <a:lstStyle/>
-          <a:p>
-            <a:pPr marL="0" indent="0">
-              <a:buNone/>
-            </a:pPr>
-            <a:r>
-              <a:rPr lang="en-US" dirty="0"/>
-              <a:t>Can you push something with a light wave?</a:t>
-            </a:r>
-          </a:p>
-          <a:p>
-            <a:pPr marL="514350" indent="-514350">
-              <a:buFont typeface="+mj-lt"/>
-              <a:buAutoNum type="alphaLcParenR"/>
-            </a:pPr>
-            <a:r>
-              <a:rPr lang="en-US" dirty="0"/>
-              <a:t>Yes</a:t>
-            </a:r>
-          </a:p>
-          <a:p>
-            <a:pPr marL="514350" indent="-514350">
-              <a:buFont typeface="+mj-lt"/>
-              <a:buAutoNum type="alphaLcParenR"/>
-            </a:pPr>
-            <a:r>
-              <a:rPr lang="en-US" dirty="0"/>
-              <a:t>No</a:t>
-            </a:r>
-          </a:p>
-          <a:p>
-            <a:pPr marL="514350" indent="-514350">
-              <a:buFont typeface="+mj-lt"/>
-              <a:buAutoNum type="alphaLcParenR"/>
-            </a:pPr>
-            <a:r>
-              <a:rPr lang="en-US" dirty="0"/>
-              <a:t>Maybe</a:t>
-            </a:r>
-          </a:p>
-        </p:txBody>
-      </p:sp>
+        </p:nvPicPr>
+        <p:blipFill>
+          <a:blip r:embed="rId4">
+            <a:extLst>
+              <a:ext uri="{28A0092B-C50C-407E-A947-70E740481C1C}">
+                <a14:useLocalDpi xmlns:a14="http://schemas.microsoft.com/office/drawing/2010/main" val="0"/>
+              </a:ext>
+            </a:extLst>
+          </a:blip>
+          <a:srcRect/>
+          <a:stretch>
+            <a:fillRect/>
+          </a:stretch>
+        </p:blipFill>
+        <p:spPr bwMode="auto">
+          <a:xfrm>
+            <a:off x="591559" y="2325447"/>
+            <a:ext cx="4512069" cy="3708550"/>
+          </a:xfrm>
+          <a:prstGeom prst="rect">
+            <a:avLst/>
+          </a:prstGeom>
+          <a:noFill/>
+          <a:extLst>
+            <a:ext uri="{909E8E84-426E-40DD-AFC4-6F175D3DCCD1}">
+              <a14:hiddenFill xmlns:a14="http://schemas.microsoft.com/office/drawing/2010/main">
+                <a:solidFill>
+                  <a:srgbClr val="FFFFFF"/>
+                </a:solidFill>
+              </a14:hiddenFill>
+            </a:ext>
+          </a:extLst>
+        </p:spPr>
+      </p:pic>
     </p:spTree>
     <p:extLst>
       <p:ext uri="{BB962C8B-B14F-4D97-AF65-F5344CB8AC3E}">
-        <p14:creationId xmlns:p14="http://schemas.microsoft.com/office/powerpoint/2010/main" val="3529796504"/>
+        <p14:creationId xmlns:p14="http://schemas.microsoft.com/office/powerpoint/2010/main" val="1333327382"/>
       </p:ext>
     </p:extLst>
   </p:cSld>
@@ -19803,6 +19922,125 @@
             </a:pPr>
             <a:r>
               <a:rPr lang="en-US" dirty="0"/>
+              <a:t>Can you push something with a light wave?</a:t>
+            </a:r>
+          </a:p>
+          <a:p>
+            <a:pPr marL="514350" indent="-514350">
+              <a:buFont typeface="+mj-lt"/>
+              <a:buAutoNum type="alphaLcParenR"/>
+            </a:pPr>
+            <a:r>
+              <a:rPr lang="en-US" dirty="0"/>
+              <a:t>Yes</a:t>
+            </a:r>
+          </a:p>
+          <a:p>
+            <a:pPr marL="514350" indent="-514350">
+              <a:buFont typeface="+mj-lt"/>
+              <a:buAutoNum type="alphaLcParenR"/>
+            </a:pPr>
+            <a:r>
+              <a:rPr lang="en-US" dirty="0"/>
+              <a:t>No</a:t>
+            </a:r>
+          </a:p>
+          <a:p>
+            <a:pPr marL="514350" indent="-514350">
+              <a:buFont typeface="+mj-lt"/>
+              <a:buAutoNum type="alphaLcParenR"/>
+            </a:pPr>
+            <a:r>
+              <a:rPr lang="en-US" dirty="0"/>
+              <a:t>Maybe</a:t>
+            </a:r>
+          </a:p>
+        </p:txBody>
+      </p:sp>
+    </p:spTree>
+    <p:extLst>
+      <p:ext uri="{BB962C8B-B14F-4D97-AF65-F5344CB8AC3E}">
+        <p14:creationId xmlns:p14="http://schemas.microsoft.com/office/powerpoint/2010/main" val="3529796504"/>
+      </p:ext>
+    </p:extLst>
+  </p:cSld>
+  <p:clrMapOvr>
+    <a:masterClrMapping/>
+  </p:clrMapOvr>
+</p:sld>
+</file>
+
+<file path=ppt/slides/slide21.xml><?xml version="1.0" encoding="utf-8"?>
+<p:sld xmlns:a="http://schemas.openxmlformats.org/drawingml/2006/main" xmlns:r="http://schemas.openxmlformats.org/officeDocument/2006/relationships" xmlns:p="http://schemas.openxmlformats.org/presentationml/2006/main">
+  <p:cSld>
+    <p:spTree>
+      <p:nvGrpSpPr>
+        <p:cNvPr id="1" name=""/>
+        <p:cNvGrpSpPr/>
+        <p:nvPr/>
+      </p:nvGrpSpPr>
+      <p:grpSpPr>
+        <a:xfrm>
+          <a:off x="0" y="0"/>
+          <a:ext cx="0" cy="0"/>
+          <a:chOff x="0" y="0"/>
+          <a:chExt cx="0" cy="0"/>
+        </a:xfrm>
+      </p:grpSpPr>
+      <p:sp>
+        <p:nvSpPr>
+          <p:cNvPr id="2" name="Title 1">
+            <a:extLst>
+              <a:ext uri="{FF2B5EF4-FFF2-40B4-BE49-F238E27FC236}">
+                <a16:creationId xmlns:a16="http://schemas.microsoft.com/office/drawing/2014/main" id="{88F79F87-888F-CE19-E30F-57F12205B401}"/>
+              </a:ext>
+            </a:extLst>
+          </p:cNvPr>
+          <p:cNvSpPr>
+            <a:spLocks noGrp="1"/>
+          </p:cNvSpPr>
+          <p:nvPr>
+            <p:ph type="title"/>
+          </p:nvPr>
+        </p:nvSpPr>
+        <p:spPr/>
+        <p:txBody>
+          <a:bodyPr/>
+          <a:lstStyle/>
+          <a:p>
+            <a:r>
+              <a:rPr lang="en-US" dirty="0"/>
+              <a:t>Question</a:t>
+            </a:r>
+          </a:p>
+        </p:txBody>
+      </p:sp>
+      <p:sp>
+        <p:nvSpPr>
+          <p:cNvPr id="3" name="Content Placeholder 2">
+            <a:extLst>
+              <a:ext uri="{FF2B5EF4-FFF2-40B4-BE49-F238E27FC236}">
+                <a16:creationId xmlns:a16="http://schemas.microsoft.com/office/drawing/2014/main" id="{1E2B2D5B-3246-F7D9-E9C8-4A9D0DC99395}"/>
+              </a:ext>
+            </a:extLst>
+          </p:cNvPr>
+          <p:cNvSpPr>
+            <a:spLocks noGrp="1"/>
+          </p:cNvSpPr>
+          <p:nvPr>
+            <p:ph idx="1"/>
+          </p:nvPr>
+        </p:nvSpPr>
+        <p:spPr/>
+        <p:txBody>
+          <a:bodyPr/>
+          <a:lstStyle/>
+          <a:p>
+            <a:pPr marL="0" indent="0">
+              <a:buNone/>
+            </a:pPr>
+            <a:r>
+              <a:rPr lang="en-US" dirty="0"/>
               <a:t>How much pressure do we get from a light wave?</a:t>
             </a:r>
           </a:p>
@@ -19869,7 +20107,7 @@
 </p:sld>
 </file>
 
-<file path=ppt/slides/slide21.xml><?xml version="1.0" encoding="utf-8"?>
+<file path=ppt/slides/slide22.xml><?xml version="1.0" encoding="utf-8"?>
 <p:sld xmlns:a="http://schemas.openxmlformats.org/drawingml/2006/main" xmlns:r="http://schemas.openxmlformats.org/officeDocument/2006/relationships" xmlns:p="http://schemas.openxmlformats.org/presentationml/2006/main">
   <p:cSld>
     <p:spTree>
@@ -19964,7 +20202,7 @@
 </p:sld>
 </file>
 
-<file path=ppt/slides/slide22.xml><?xml version="1.0" encoding="utf-8"?>
+<file path=ppt/slides/slide23.xml><?xml version="1.0" encoding="utf-8"?>
 <p:sld xmlns:a="http://schemas.openxmlformats.org/drawingml/2006/main" xmlns:r="http://schemas.openxmlformats.org/officeDocument/2006/relationships" xmlns:p="http://schemas.openxmlformats.org/presentationml/2006/main">
   <p:cSld>
     <p:spTree>
@@ -23911,7 +24149,7 @@
 </p:sld>
 </file>
 
-<file path=ppt/slides/slide23.xml><?xml version="1.0" encoding="utf-8"?>
+<file path=ppt/slides/slide24.xml><?xml version="1.0" encoding="utf-8"?>
 <p:sld xmlns:a="http://schemas.openxmlformats.org/drawingml/2006/main" xmlns:r="http://schemas.openxmlformats.org/officeDocument/2006/relationships" xmlns:p="http://schemas.openxmlformats.org/presentationml/2006/main">
   <p:cSld>
     <p:spTree>
@@ -23969,7 +24207,7 @@
 </p:sld>
 </file>
 
-<file path=ppt/slides/slide24.xml><?xml version="1.0" encoding="utf-8"?>
+<file path=ppt/slides/slide25.xml><?xml version="1.0" encoding="utf-8"?>
 <p:sld xmlns:a="http://schemas.openxmlformats.org/drawingml/2006/main" xmlns:r="http://schemas.openxmlformats.org/officeDocument/2006/relationships" xmlns:p="http://schemas.openxmlformats.org/presentationml/2006/main">
   <p:cSld>
     <p:spTree>

</xml_diff>